<commit_message>
Updated slides to reflect feedback
</commit_message>
<xml_diff>
--- a/Docker 101.pptx
+++ b/Docker 101.pptx
@@ -17,10 +17,11 @@
     <p:sldId id="267" r:id="rId11"/>
     <p:sldId id="270" r:id="rId12"/>
     <p:sldId id="268" r:id="rId13"/>
-    <p:sldId id="269" r:id="rId14"/>
-    <p:sldId id="271" r:id="rId15"/>
-    <p:sldId id="263" r:id="rId16"/>
-    <p:sldId id="261" r:id="rId17"/>
+    <p:sldId id="272" r:id="rId14"/>
+    <p:sldId id="269" r:id="rId15"/>
+    <p:sldId id="271" r:id="rId16"/>
+    <p:sldId id="263" r:id="rId17"/>
+    <p:sldId id="261" r:id="rId18"/>
   </p:sldIdLst>
   <p:sldSz cx="12192000" cy="6858000"/>
   <p:notesSz cx="6858000" cy="9144000"/>
@@ -274,7 +275,7 @@
           <a:p>
             <a:fld id="{231824F4-AB9C-4D04-B21E-D0E0598E59B5}" type="datetimeFigureOut">
               <a:rPr lang="en-US" smtClean="0"/>
-              <a:t>3/3/2020</a:t>
+              <a:t>3/4/2020</a:t>
             </a:fld>
             <a:endParaRPr lang="en-US"/>
           </a:p>
@@ -472,7 +473,7 @@
           <a:p>
             <a:fld id="{231824F4-AB9C-4D04-B21E-D0E0598E59B5}" type="datetimeFigureOut">
               <a:rPr lang="en-US" smtClean="0"/>
-              <a:t>3/3/2020</a:t>
+              <a:t>3/4/2020</a:t>
             </a:fld>
             <a:endParaRPr lang="en-US"/>
           </a:p>
@@ -680,7 +681,7 @@
           <a:p>
             <a:fld id="{231824F4-AB9C-4D04-B21E-D0E0598E59B5}" type="datetimeFigureOut">
               <a:rPr lang="en-US" smtClean="0"/>
-              <a:t>3/3/2020</a:t>
+              <a:t>3/4/2020</a:t>
             </a:fld>
             <a:endParaRPr lang="en-US"/>
           </a:p>
@@ -878,7 +879,7 @@
           <a:p>
             <a:fld id="{231824F4-AB9C-4D04-B21E-D0E0598E59B5}" type="datetimeFigureOut">
               <a:rPr lang="en-US" smtClean="0"/>
-              <a:t>3/3/2020</a:t>
+              <a:t>3/4/2020</a:t>
             </a:fld>
             <a:endParaRPr lang="en-US"/>
           </a:p>
@@ -1153,7 +1154,7 @@
           <a:p>
             <a:fld id="{231824F4-AB9C-4D04-B21E-D0E0598E59B5}" type="datetimeFigureOut">
               <a:rPr lang="en-US" smtClean="0"/>
-              <a:t>3/3/2020</a:t>
+              <a:t>3/4/2020</a:t>
             </a:fld>
             <a:endParaRPr lang="en-US"/>
           </a:p>
@@ -1418,7 +1419,7 @@
           <a:p>
             <a:fld id="{231824F4-AB9C-4D04-B21E-D0E0598E59B5}" type="datetimeFigureOut">
               <a:rPr lang="en-US" smtClean="0"/>
-              <a:t>3/3/2020</a:t>
+              <a:t>3/4/2020</a:t>
             </a:fld>
             <a:endParaRPr lang="en-US"/>
           </a:p>
@@ -1830,7 +1831,7 @@
           <a:p>
             <a:fld id="{231824F4-AB9C-4D04-B21E-D0E0598E59B5}" type="datetimeFigureOut">
               <a:rPr lang="en-US" smtClean="0"/>
-              <a:t>3/3/2020</a:t>
+              <a:t>3/4/2020</a:t>
             </a:fld>
             <a:endParaRPr lang="en-US"/>
           </a:p>
@@ -1971,7 +1972,7 @@
           <a:p>
             <a:fld id="{231824F4-AB9C-4D04-B21E-D0E0598E59B5}" type="datetimeFigureOut">
               <a:rPr lang="en-US" smtClean="0"/>
-              <a:t>3/3/2020</a:t>
+              <a:t>3/4/2020</a:t>
             </a:fld>
             <a:endParaRPr lang="en-US"/>
           </a:p>
@@ -2084,7 +2085,7 @@
           <a:p>
             <a:fld id="{231824F4-AB9C-4D04-B21E-D0E0598E59B5}" type="datetimeFigureOut">
               <a:rPr lang="en-US" smtClean="0"/>
-              <a:t>3/3/2020</a:t>
+              <a:t>3/4/2020</a:t>
             </a:fld>
             <a:endParaRPr lang="en-US"/>
           </a:p>
@@ -2395,7 +2396,7 @@
           <a:p>
             <a:fld id="{231824F4-AB9C-4D04-B21E-D0E0598E59B5}" type="datetimeFigureOut">
               <a:rPr lang="en-US" smtClean="0"/>
-              <a:t>3/3/2020</a:t>
+              <a:t>3/4/2020</a:t>
             </a:fld>
             <a:endParaRPr lang="en-US"/>
           </a:p>
@@ -2683,7 +2684,7 @@
           <a:p>
             <a:fld id="{231824F4-AB9C-4D04-B21E-D0E0598E59B5}" type="datetimeFigureOut">
               <a:rPr lang="en-US" smtClean="0"/>
-              <a:t>3/3/2020</a:t>
+              <a:t>3/4/2020</a:t>
             </a:fld>
             <a:endParaRPr lang="en-US"/>
           </a:p>
@@ -2924,7 +2925,7 @@
           <a:p>
             <a:fld id="{231824F4-AB9C-4D04-B21E-D0E0598E59B5}" type="datetimeFigureOut">
               <a:rPr lang="en-US" smtClean="0"/>
-              <a:t>3/3/2020</a:t>
+              <a:t>3/4/2020</a:t>
             </a:fld>
             <a:endParaRPr lang="en-US"/>
           </a:p>
@@ -3646,6 +3647,12 @@
           <a:bodyPr/>
           <a:lstStyle/>
           <a:p>
+            <a:r>
+              <a:rPr lang="en-US" dirty="0"/>
+              <a:t>Most interactions with containers are from outside – i.e. from the context of the host OS.  But you can, in many circumstances, run a shell inside the container and issue commands to the containerized OS</a:t>
+            </a:r>
+          </a:p>
+          <a:p>
             <a:pPr marL="0" indent="0">
               <a:buNone/>
             </a:pPr>
@@ -3653,19 +3660,7 @@
               <a:rPr lang="en-US" dirty="0">
                 <a:latin typeface="Consolas" panose="020B0609020204030204" pitchFamily="49" charset="0"/>
               </a:rPr>
-              <a:t>docker </a:t>
-            </a:r>
-            <a:r>
-              <a:rPr lang="en-US">
-                <a:latin typeface="Consolas" panose="020B0609020204030204" pitchFamily="49" charset="0"/>
-              </a:rPr>
-              <a:t>run -</a:t>
-            </a:r>
-            <a:r>
-              <a:rPr lang="en-US" dirty="0">
-                <a:latin typeface="Consolas" panose="020B0609020204030204" pitchFamily="49" charset="0"/>
-              </a:rPr>
-              <a:t>it hi /bin/</a:t>
+              <a:t>docker run -it hi /bin/</a:t>
             </a:r>
             <a:r>
               <a:rPr lang="en-US" dirty="0" err="1">
@@ -3779,11 +3774,7 @@
           <a:p>
             <a:r>
               <a:rPr lang="en-US" dirty="0"/>
-              <a:t>Mounting host paths into </a:t>
-            </a:r>
-            <a:r>
-              <a:rPr lang="en-US"/>
-              <a:t>a container</a:t>
+              <a:t>Persisting files across container invocations</a:t>
             </a:r>
           </a:p>
         </p:txBody>
@@ -3806,10 +3797,41 @@
         </p:nvSpPr>
         <p:spPr/>
         <p:txBody>
-          <a:bodyPr/>
-          <a:lstStyle/>
-          <a:p>
-            <a:endParaRPr lang="en-US"/>
+          <a:bodyPr>
+            <a:normAutofit/>
+          </a:bodyPr>
+          <a:lstStyle/>
+          <a:p>
+            <a:r>
+              <a:rPr lang="en-US" dirty="0"/>
+              <a:t>Any files written to the container’s internal filesystem at runtime are saved in a </a:t>
+            </a:r>
+            <a:r>
+              <a:rPr lang="en-US" dirty="0" err="1"/>
+              <a:t>tmpfs</a:t>
+            </a:r>
+            <a:r>
+              <a:rPr lang="en-US" dirty="0"/>
+              <a:t> and do not persist across container invocations</a:t>
+            </a:r>
+          </a:p>
+          <a:p>
+            <a:r>
+              <a:rPr lang="en-US" dirty="0"/>
+              <a:t>If you need persistent data for your containerized applications, you will need to mount a volume inside your container</a:t>
+            </a:r>
+          </a:p>
+          <a:p>
+            <a:r>
+              <a:rPr lang="en-US" dirty="0"/>
+              <a:t>A mounted volume can be any directory on the host.  Files written or read by the container can be stored there and will persist across container invocations</a:t>
+            </a:r>
+          </a:p>
+          <a:p>
+            <a:r>
+              <a:rPr lang="en-US" dirty="0"/>
+              <a:t>Containers run (internally) as root, by default.  You can change the user and group IDs that run inside the container.</a:t>
+            </a:r>
           </a:p>
         </p:txBody>
       </p:sp>
@@ -3848,7 +3870,7 @@
           <p:cNvPr id="2" name="Title 1">
             <a:extLst>
               <a:ext uri="{FF2B5EF4-FFF2-40B4-BE49-F238E27FC236}">
-                <a16:creationId xmlns:a16="http://schemas.microsoft.com/office/drawing/2014/main" id="{87778D7A-01CA-4F2E-8D4E-223B2969E35A}"/>
+                <a16:creationId xmlns:a16="http://schemas.microsoft.com/office/drawing/2014/main" id="{180487D7-8191-4448-B0AD-24091C81FE70}"/>
               </a:ext>
             </a:extLst>
           </p:cNvPr>
@@ -3866,7 +3888,7 @@
           <a:p>
             <a:r>
               <a:rPr lang="en-US" dirty="0"/>
-              <a:t>Use cases</a:t>
+              <a:t>Mounted volume examples</a:t>
             </a:r>
           </a:p>
         </p:txBody>
@@ -3876,7 +3898,7 @@
           <p:cNvPr id="3" name="Content Placeholder 2">
             <a:extLst>
               <a:ext uri="{FF2B5EF4-FFF2-40B4-BE49-F238E27FC236}">
-                <a16:creationId xmlns:a16="http://schemas.microsoft.com/office/drawing/2014/main" id="{DDF38876-E38B-4D6B-8750-D8E224CB9791}"/>
+                <a16:creationId xmlns:a16="http://schemas.microsoft.com/office/drawing/2014/main" id="{7B5CFB0F-57FE-4F35-A489-4490C44459D8}"/>
               </a:ext>
             </a:extLst>
           </p:cNvPr>
@@ -3892,14 +3914,124 @@
           <a:bodyPr/>
           <a:lstStyle/>
           <a:p>
-            <a:endParaRPr lang="en-US"/>
+            <a:pPr marL="0" indent="0">
+              <a:buNone/>
+            </a:pPr>
+            <a:r>
+              <a:rPr lang="en-US" dirty="0"/>
+              <a:t>cd mount</a:t>
+            </a:r>
+          </a:p>
+          <a:p>
+            <a:pPr marL="0" indent="0">
+              <a:buNone/>
+            </a:pPr>
+            <a:r>
+              <a:rPr lang="en-US" dirty="0"/>
+              <a:t>docker build . --tag </a:t>
+            </a:r>
+            <a:r>
+              <a:rPr lang="en-US" dirty="0" err="1"/>
+              <a:t>writer:latest</a:t>
+            </a:r>
+            <a:endParaRPr lang="en-US" dirty="0"/>
+          </a:p>
+          <a:p>
+            <a:pPr marL="0" indent="0">
+              <a:buNone/>
+            </a:pPr>
+            <a:r>
+              <a:rPr lang="en-US" dirty="0"/>
+              <a:t>docker run writer foo.txt</a:t>
+            </a:r>
+          </a:p>
+          <a:p>
+            <a:pPr marL="0" indent="0">
+              <a:buNone/>
+            </a:pPr>
+            <a:r>
+              <a:rPr lang="en-US" dirty="0"/>
+              <a:t>docker run --rm -it --</a:t>
+            </a:r>
+            <a:r>
+              <a:rPr lang="en-US" dirty="0" err="1"/>
+              <a:t>entrypoint</a:t>
+            </a:r>
+            <a:r>
+              <a:rPr lang="en-US" dirty="0"/>
+              <a:t>=/bin/</a:t>
+            </a:r>
+            <a:r>
+              <a:rPr lang="en-US" dirty="0" err="1"/>
+              <a:t>sh</a:t>
+            </a:r>
+            <a:r>
+              <a:rPr lang="en-US" dirty="0"/>
+              <a:t> writer</a:t>
+            </a:r>
+          </a:p>
+          <a:p>
+            <a:pPr marL="0" indent="0">
+              <a:buNone/>
+            </a:pPr>
+            <a:r>
+              <a:rPr lang="en-US" dirty="0"/>
+              <a:t>docker run -v $(</a:t>
+            </a:r>
+            <a:r>
+              <a:rPr lang="en-US" dirty="0" err="1"/>
+              <a:t>pwd</a:t>
+            </a:r>
+            <a:r>
+              <a:rPr lang="en-US" dirty="0"/>
+              <a:t>)/:/host </a:t>
+            </a:r>
+            <a:r>
+              <a:rPr lang="en-US" dirty="0" err="1"/>
+              <a:t>writer:latest</a:t>
+            </a:r>
+            <a:r>
+              <a:rPr lang="en-US" dirty="0"/>
+              <a:t> /host/bar.txt</a:t>
+            </a:r>
+          </a:p>
+          <a:p>
+            <a:pPr marL="0" indent="0">
+              <a:buNone/>
+            </a:pPr>
+            <a:r>
+              <a:rPr lang="en-US" dirty="0"/>
+              <a:t>docker run --user $(id -u):$(id -g) -v $(</a:t>
+            </a:r>
+            <a:r>
+              <a:rPr lang="en-US" dirty="0" err="1"/>
+              <a:t>pwd</a:t>
+            </a:r>
+            <a:r>
+              <a:rPr lang="en-US" dirty="0"/>
+              <a:t>)/:/host </a:t>
+            </a:r>
+            <a:r>
+              <a:rPr lang="en-US" dirty="0" err="1"/>
+              <a:t>writer:latest</a:t>
+            </a:r>
+            <a:r>
+              <a:rPr lang="en-US" dirty="0"/>
+              <a:t> /host/baz.txt</a:t>
+            </a:r>
+          </a:p>
+          <a:p>
+            <a:pPr marL="0" indent="0">
+              <a:buNone/>
+            </a:pPr>
+            <a:endParaRPr lang="en-US" dirty="0"/>
           </a:p>
         </p:txBody>
       </p:sp>
     </p:spTree>
     <p:extLst>
       <p:ext uri="{BB962C8B-B14F-4D97-AF65-F5344CB8AC3E}">
-        <p14:creationId xmlns:p14="http://schemas.microsoft.com/office/powerpoint/2010/main" val="1441775669"/>
+        <p14:creationId xmlns:p14="http://schemas.microsoft.com/office/powerpoint/2010/main" val="1850874116"/>
       </p:ext>
     </p:extLst>
   </p:cSld>
@@ -3931,7 +4063,7 @@
           <p:cNvPr id="2" name="Title 1">
             <a:extLst>
               <a:ext uri="{FF2B5EF4-FFF2-40B4-BE49-F238E27FC236}">
-                <a16:creationId xmlns:a16="http://schemas.microsoft.com/office/drawing/2014/main" id="{8E5CEC76-8D9A-4722-BFAD-89293CFFF54F}"/>
+                <a16:creationId xmlns:a16="http://schemas.microsoft.com/office/drawing/2014/main" id="{87778D7A-01CA-4F2E-8D4E-223B2969E35A}"/>
               </a:ext>
             </a:extLst>
           </p:cNvPr>
@@ -3949,11 +4081,7 @@
           <a:p>
             <a:r>
               <a:rPr lang="en-US" dirty="0"/>
-              <a:t>Orchestrating </a:t>
-            </a:r>
-            <a:r>
-              <a:rPr lang="en-US"/>
-              <a:t>several containers</a:t>
+              <a:t>Use cases</a:t>
             </a:r>
           </a:p>
         </p:txBody>
@@ -3963,7 +4091,7 @@
           <p:cNvPr id="3" name="Content Placeholder 2">
             <a:extLst>
               <a:ext uri="{FF2B5EF4-FFF2-40B4-BE49-F238E27FC236}">
-                <a16:creationId xmlns:a16="http://schemas.microsoft.com/office/drawing/2014/main" id="{DC0C6E15-C11D-4326-B0BD-7DC297368D16}"/>
+                <a16:creationId xmlns:a16="http://schemas.microsoft.com/office/drawing/2014/main" id="{DDF38876-E38B-4D6B-8750-D8E224CB9791}"/>
               </a:ext>
             </a:extLst>
           </p:cNvPr>
@@ -3979,14 +4107,17 @@
           <a:bodyPr/>
           <a:lstStyle/>
           <a:p>
-            <a:endParaRPr lang="en-US"/>
+            <a:r>
+              <a:rPr lang="en-US" dirty="0"/>
+              <a:t>Blackjack project – Dan Heinen</a:t>
+            </a:r>
           </a:p>
         </p:txBody>
       </p:sp>
     </p:spTree>
     <p:extLst>
       <p:ext uri="{BB962C8B-B14F-4D97-AF65-F5344CB8AC3E}">
-        <p14:creationId xmlns:p14="http://schemas.microsoft.com/office/powerpoint/2010/main" val="3071067767"/>
+        <p14:creationId xmlns:p14="http://schemas.microsoft.com/office/powerpoint/2010/main" val="1441775669"/>
       </p:ext>
     </p:extLst>
   </p:cSld>
@@ -4018,6 +4149,252 @@
           <p:cNvPr id="2" name="Title 1">
             <a:extLst>
               <a:ext uri="{FF2B5EF4-FFF2-40B4-BE49-F238E27FC236}">
+                <a16:creationId xmlns:a16="http://schemas.microsoft.com/office/drawing/2014/main" id="{8E5CEC76-8D9A-4722-BFAD-89293CFFF54F}"/>
+              </a:ext>
+            </a:extLst>
+          </p:cNvPr>
+          <p:cNvSpPr>
+            <a:spLocks noGrp="1"/>
+          </p:cNvSpPr>
+          <p:nvPr>
+            <p:ph type="title"/>
+          </p:nvPr>
+        </p:nvSpPr>
+        <p:spPr/>
+        <p:txBody>
+          <a:bodyPr/>
+          <a:lstStyle/>
+          <a:p>
+            <a:r>
+              <a:rPr lang="en-US" dirty="0"/>
+              <a:t>Container orchestration with docker-compose</a:t>
+            </a:r>
+          </a:p>
+        </p:txBody>
+      </p:sp>
+      <p:sp>
+        <p:nvSpPr>
+          <p:cNvPr id="3" name="Content Placeholder 2">
+            <a:extLst>
+              <a:ext uri="{FF2B5EF4-FFF2-40B4-BE49-F238E27FC236}">
+                <a16:creationId xmlns:a16="http://schemas.microsoft.com/office/drawing/2014/main" id="{DC0C6E15-C11D-4326-B0BD-7DC297368D16}"/>
+              </a:ext>
+            </a:extLst>
+          </p:cNvPr>
+          <p:cNvSpPr>
+            <a:spLocks noGrp="1"/>
+          </p:cNvSpPr>
+          <p:nvPr>
+            <p:ph idx="1"/>
+          </p:nvPr>
+        </p:nvSpPr>
+        <p:spPr/>
+        <p:txBody>
+          <a:bodyPr>
+            <a:normAutofit fontScale="77500" lnSpcReduction="20000"/>
+          </a:bodyPr>
+          <a:lstStyle/>
+          <a:p>
+            <a:pPr marL="0" indent="0">
+              <a:buNone/>
+            </a:pPr>
+            <a:r>
+              <a:rPr lang="en-US" dirty="0">
+                <a:latin typeface="Consolas" panose="020B0609020204030204" pitchFamily="49" charset="0"/>
+              </a:rPr>
+              <a:t>version: '3'</a:t>
+            </a:r>
+          </a:p>
+          <a:p>
+            <a:pPr marL="0" indent="0">
+              <a:buNone/>
+            </a:pPr>
+            <a:r>
+              <a:rPr lang="en-US" dirty="0">
+                <a:latin typeface="Consolas" panose="020B0609020204030204" pitchFamily="49" charset="0"/>
+              </a:rPr>
+              <a:t>services:</a:t>
+            </a:r>
+          </a:p>
+          <a:p>
+            <a:pPr marL="0" indent="0">
+              <a:buNone/>
+            </a:pPr>
+            <a:r>
+              <a:rPr lang="en-US" dirty="0">
+                <a:latin typeface="Consolas" panose="020B0609020204030204" pitchFamily="49" charset="0"/>
+              </a:rPr>
+              <a:t>  server:</a:t>
+            </a:r>
+          </a:p>
+          <a:p>
+            <a:pPr marL="0" indent="0">
+              <a:buNone/>
+            </a:pPr>
+            <a:r>
+              <a:rPr lang="en-US" dirty="0">
+                <a:latin typeface="Consolas" panose="020B0609020204030204" pitchFamily="49" charset="0"/>
+              </a:rPr>
+              <a:t>    build: server/</a:t>
+            </a:r>
+          </a:p>
+          <a:p>
+            <a:pPr marL="0" indent="0">
+              <a:buNone/>
+            </a:pPr>
+            <a:r>
+              <a:rPr lang="en-US" dirty="0">
+                <a:latin typeface="Consolas" panose="020B0609020204030204" pitchFamily="49" charset="0"/>
+              </a:rPr>
+              <a:t>    ports:</a:t>
+            </a:r>
+          </a:p>
+          <a:p>
+            <a:pPr marL="0" indent="0">
+              <a:buNone/>
+            </a:pPr>
+            <a:r>
+              <a:rPr lang="en-US" dirty="0">
+                <a:latin typeface="Consolas" panose="020B0609020204030204" pitchFamily="49" charset="0"/>
+              </a:rPr>
+              <a:t>    - "1234:1234"</a:t>
+            </a:r>
+          </a:p>
+          <a:p>
+            <a:pPr marL="0" indent="0">
+              <a:buNone/>
+            </a:pPr>
+            <a:r>
+              <a:rPr lang="en-US" dirty="0">
+                <a:latin typeface="Consolas" panose="020B0609020204030204" pitchFamily="49" charset="0"/>
+              </a:rPr>
+              <a:t>  client:</a:t>
+            </a:r>
+          </a:p>
+          <a:p>
+            <a:pPr marL="0" indent="0">
+              <a:buNone/>
+            </a:pPr>
+            <a:r>
+              <a:rPr lang="en-US" dirty="0">
+                <a:latin typeface="Consolas" panose="020B0609020204030204" pitchFamily="49" charset="0"/>
+              </a:rPr>
+              <a:t>    build: client/</a:t>
+            </a:r>
+          </a:p>
+          <a:p>
+            <a:pPr marL="0" indent="0">
+              <a:buNone/>
+            </a:pPr>
+            <a:r>
+              <a:rPr lang="en-US" dirty="0">
+                <a:latin typeface="Consolas" panose="020B0609020204030204" pitchFamily="49" charset="0"/>
+              </a:rPr>
+              <a:t>    command: "hello from docker-compose"</a:t>
+            </a:r>
+          </a:p>
+          <a:p>
+            <a:pPr marL="0" indent="0">
+              <a:buNone/>
+            </a:pPr>
+            <a:r>
+              <a:rPr lang="en-US" dirty="0">
+                <a:latin typeface="Consolas" panose="020B0609020204030204" pitchFamily="49" charset="0"/>
+              </a:rPr>
+              <a:t>    </a:t>
+            </a:r>
+            <a:r>
+              <a:rPr lang="en-US" dirty="0" err="1">
+                <a:latin typeface="Consolas" panose="020B0609020204030204" pitchFamily="49" charset="0"/>
+              </a:rPr>
+              <a:t>network_mode</a:t>
+            </a:r>
+            <a:r>
+              <a:rPr lang="en-US" dirty="0">
+                <a:latin typeface="Consolas" panose="020B0609020204030204" pitchFamily="49" charset="0"/>
+              </a:rPr>
+              <a:t>: host</a:t>
+            </a:r>
+          </a:p>
+          <a:p>
+            <a:pPr marL="0" indent="0">
+              <a:buNone/>
+            </a:pPr>
+            <a:r>
+              <a:rPr lang="en-US" dirty="0">
+                <a:latin typeface="Consolas" panose="020B0609020204030204" pitchFamily="49" charset="0"/>
+              </a:rPr>
+              <a:t>    </a:t>
+            </a:r>
+            <a:r>
+              <a:rPr lang="en-US" dirty="0" err="1">
+                <a:latin typeface="Consolas" panose="020B0609020204030204" pitchFamily="49" charset="0"/>
+              </a:rPr>
+              <a:t>depends_on</a:t>
+            </a:r>
+            <a:r>
+              <a:rPr lang="en-US" dirty="0">
+                <a:latin typeface="Consolas" panose="020B0609020204030204" pitchFamily="49" charset="0"/>
+              </a:rPr>
+              <a:t>: </a:t>
+            </a:r>
+          </a:p>
+          <a:p>
+            <a:pPr marL="0" indent="0">
+              <a:buNone/>
+            </a:pPr>
+            <a:r>
+              <a:rPr lang="en-US" dirty="0">
+                <a:latin typeface="Consolas" panose="020B0609020204030204" pitchFamily="49" charset="0"/>
+              </a:rPr>
+              <a:t>      - server</a:t>
+            </a:r>
+          </a:p>
+          <a:p>
+            <a:pPr marL="0" indent="0">
+              <a:buNone/>
+            </a:pPr>
+            <a:endParaRPr lang="en-US" dirty="0">
+              <a:latin typeface="Consolas" panose="020B0609020204030204" pitchFamily="49" charset="0"/>
+            </a:endParaRPr>
+          </a:p>
+        </p:txBody>
+      </p:sp>
+    </p:spTree>
+    <p:extLst>
+      <p:ext uri="{BB962C8B-B14F-4D97-AF65-F5344CB8AC3E}">
+        <p14:creationId xmlns:p14="http://schemas.microsoft.com/office/powerpoint/2010/main" val="3071067767"/>
+      </p:ext>
+    </p:extLst>
+  </p:cSld>
+  <p:clrMapOvr>
+    <a:masterClrMapping/>
+  </p:clrMapOvr>
+</p:sld>
+</file>
+
+<file path=ppt/slides/slide16.xml><?xml version="1.0" encoding="utf-8"?>
+<p:sld xmlns:a="http://schemas.openxmlformats.org/drawingml/2006/main" xmlns:r="http://schemas.openxmlformats.org/officeDocument/2006/relationships" xmlns:p="http://schemas.openxmlformats.org/presentationml/2006/main">
+  <p:cSld>
+    <p:spTree>
+      <p:nvGrpSpPr>
+        <p:cNvPr id="1" name=""/>
+        <p:cNvGrpSpPr/>
+        <p:nvPr/>
+      </p:nvGrpSpPr>
+      <p:grpSpPr>
+        <a:xfrm>
+          <a:off x="0" y="0"/>
+          <a:ext cx="0" cy="0"/>
+          <a:chOff x="0" y="0"/>
+          <a:chExt cx="0" cy="0"/>
+        </a:xfrm>
+      </p:grpSpPr>
+      <p:sp>
+        <p:nvSpPr>
+          <p:cNvPr id="2" name="Title 1">
+            <a:extLst>
+              <a:ext uri="{FF2B5EF4-FFF2-40B4-BE49-F238E27FC236}">
                 <a16:creationId xmlns:a16="http://schemas.microsoft.com/office/drawing/2014/main" id="{413A9F35-B62C-4EE9-B4A9-F66DE27E7B91}"/>
               </a:ext>
             </a:extLst>
@@ -4106,7 +4483,7 @@
 </p:sld>
 </file>
 
-<file path=ppt/slides/slide16.xml><?xml version="1.0" encoding="utf-8"?>
+<file path=ppt/slides/slide17.xml><?xml version="1.0" encoding="utf-8"?>
 <p:sld xmlns:a="http://schemas.openxmlformats.org/drawingml/2006/main" xmlns:r="http://schemas.openxmlformats.org/officeDocument/2006/relationships" xmlns:p="http://schemas.openxmlformats.org/presentationml/2006/main">
   <p:cSld>
     <p:spTree>

</xml_diff>